<commit_message>
fix: add reference to slide
</commit_message>
<xml_diff>
--- a/slides/02-js-basics.pptx
+++ b/slides/02-js-basics.pptx
@@ -647,11 +647,7 @@
           <a:bodyPr/>
           <a:lstStyle/>
           <a:p>
-            <a:r>
-              <a:rPr lang="hu-HU"/>
-              <a:t>Check: 1-create-html-with-js.html</a:t>
-            </a:r>
-            <a:endParaRPr lang="en-US"/>
+            <a:endParaRPr lang="en-US" dirty="0"/>
           </a:p>
         </p:txBody>
       </p:sp>
@@ -735,11 +731,7 @@
           <a:bodyPr/>
           <a:lstStyle/>
           <a:p>
-            <a:r>
-              <a:rPr lang="hu-HU"/>
-              <a:t>Check: 2a-event-handling.html &amp; 2b-event-handling.html</a:t>
-            </a:r>
-            <a:endParaRPr lang="en-US"/>
+            <a:endParaRPr lang="en-US" dirty="0"/>
           </a:p>
         </p:txBody>
       </p:sp>
@@ -35672,7 +35664,7 @@
           <a:p>
             <a:pPr algn="l"/>
             <a:r>
-              <a:rPr lang="hu-HU"/>
+              <a:rPr lang="hu-HU" dirty="0"/>
               <a:t>The most likely used structured types after functions</a:t>
             </a:r>
           </a:p>
@@ -35682,7 +35674,7 @@
               <a:buChar char="•"/>
             </a:pPr>
             <a:r>
-              <a:rPr lang="hu-HU"/>
+              <a:rPr lang="hu-HU" dirty="0"/>
               <a:t>Iterable object</a:t>
             </a:r>
           </a:p>
@@ -35692,7 +35684,7 @@
               <a:buChar char="•"/>
             </a:pPr>
             <a:r>
-              <a:rPr lang="hu-HU"/>
+              <a:rPr lang="hu-HU" dirty="0"/>
               <a:t>Stores a collection of multiple items under a single variable name</a:t>
             </a:r>
           </a:p>
@@ -35702,7 +35694,7 @@
               <a:buChar char="•"/>
             </a:pPr>
             <a:r>
-              <a:rPr lang="hu-HU"/>
+              <a:rPr lang="hu-HU" dirty="0"/>
               <a:t>Has members for performing common array operations</a:t>
             </a:r>
           </a:p>
@@ -35711,11 +35703,11 @@
               <a:buFont typeface="Arial" panose="020B0604020202020204" pitchFamily="34" charset="0"/>
               <a:buChar char="•"/>
             </a:pPr>
-            <a:endParaRPr lang="hu-HU"/>
-          </a:p>
-          <a:p>
-            <a:r>
-              <a:rPr lang="hu-HU"/>
+            <a:endParaRPr lang="hu-HU" dirty="0"/>
+          </a:p>
+          <a:p>
+            <a:r>
+              <a:rPr lang="hu-HU" dirty="0"/>
               <a:t>Not primivite: resource type</a:t>
             </a:r>
           </a:p>
@@ -35725,7 +35717,7 @@
               <a:buChar char="•"/>
             </a:pPr>
             <a:r>
-              <a:rPr lang="hu-HU"/>
+              <a:rPr lang="hu-HU" dirty="0"/>
               <a:t>Resizable and can contain a mix of different data types (not suggested – use typed arrays)</a:t>
             </a:r>
           </a:p>
@@ -35735,7 +35727,7 @@
               <a:buChar char="•"/>
             </a:pPr>
             <a:r>
-              <a:rPr lang="hu-HU"/>
+              <a:rPr lang="hu-HU" dirty="0"/>
               <a:t>Elements must be accessed using nonnegative integers</a:t>
             </a:r>
           </a:p>
@@ -35745,7 +35737,7 @@
               <a:buChar char="•"/>
             </a:pPr>
             <a:r>
-              <a:rPr lang="hu-HU"/>
+              <a:rPr lang="hu-HU" dirty="0"/>
               <a:t>Zero indexed</a:t>
             </a:r>
           </a:p>
@@ -35755,30 +35747,60 @@
               <a:buChar char="•"/>
             </a:pPr>
             <a:r>
-              <a:rPr lang="hu-HU"/>
-              <a:t>Array-copy: shallow copy</a:t>
-            </a:r>
-          </a:p>
-          <a:p>
-            <a:endParaRPr lang="hu-HU"/>
-          </a:p>
-          <a:p>
-            <a:endParaRPr lang="hu-HU"/>
-          </a:p>
-          <a:p>
-            <a:endParaRPr lang="hu-HU"/>
-          </a:p>
-          <a:p>
-            <a:endParaRPr lang="hu-HU"/>
-          </a:p>
-          <a:p>
-            <a:r>
-              <a:rPr lang="hu-HU" sz="1000">
+              <a:rPr lang="hu-HU" dirty="0"/>
+              <a:t>Array-copy:</a:t>
+            </a:r>
+            <a:endParaRPr lang="en-US" dirty="0"/>
+          </a:p>
+          <a:p>
+            <a:pPr marL="1200150" lvl="2" indent="-285750">
+              <a:buFont typeface="Arial" panose="020B0604020202020204" pitchFamily="34" charset="0"/>
+              <a:buChar char="•"/>
+            </a:pPr>
+            <a:r>
+              <a:rPr lang="hu-HU" dirty="0"/>
+              <a:t>shallow copy</a:t>
+            </a:r>
+            <a:r>
+              <a:rPr lang="en-US" dirty="0"/>
+              <a:t> (spread operator)</a:t>
+            </a:r>
+          </a:p>
+          <a:p>
+            <a:pPr marL="1200150" lvl="2" indent="-285750">
+              <a:buFont typeface="Arial" panose="020B0604020202020204" pitchFamily="34" charset="0"/>
+              <a:buChar char="•"/>
+            </a:pPr>
+            <a:r>
+              <a:rPr lang="en-US" dirty="0"/>
+              <a:t>Deep clone (</a:t>
+            </a:r>
+            <a:r>
+              <a:rPr lang="en-US" dirty="0" err="1">
                 <a:hlinkClick r:id="rId2"/>
               </a:rPr>
+              <a:t>structuredClone</a:t>
+            </a:r>
+            <a:r>
+              <a:rPr lang="en-US" dirty="0"/>
+              <a:t>)</a:t>
+            </a:r>
+            <a:endParaRPr lang="hu-HU" dirty="0"/>
+          </a:p>
+          <a:p>
+            <a:endParaRPr lang="hu-HU" dirty="0"/>
+          </a:p>
+          <a:p>
+            <a:endParaRPr lang="hu-HU" dirty="0"/>
+          </a:p>
+          <a:p>
+            <a:r>
+              <a:rPr lang="hu-HU" sz="1000" dirty="0">
+                <a:hlinkClick r:id="rId3"/>
+              </a:rPr>
               <a:t>https://developer.mozilla.org/en-US/docs/Web/JavaScript/Reference/Global_Objects/Array</a:t>
             </a:r>
-            <a:endParaRPr lang="hu-HU" sz="1000"/>
+            <a:endParaRPr lang="hu-HU" sz="1000" dirty="0"/>
           </a:p>
         </p:txBody>
       </p:sp>
@@ -37720,12 +37742,6 @@
 </file>
 
 <file path=customXml/item1.xml><?xml version="1.0" encoding="utf-8"?>
-<p:properties xmlns:p="http://schemas.microsoft.com/office/2006/metadata/properties" xmlns:xsi="http://www.w3.org/2001/XMLSchema-instance" xmlns:pc="http://schemas.microsoft.com/office/infopath/2007/PartnerControls">
-  <documentManagement/>
-</p:properties>
-</file>
-
-<file path=customXml/item2.xml><?xml version="1.0" encoding="utf-8"?>
 <ct:contentTypeSchema xmlns:ct="http://schemas.microsoft.com/office/2006/metadata/contentType" xmlns:ma="http://schemas.microsoft.com/office/2006/metadata/properties/metaAttributes" ct:_="" ma:_="" ma:contentTypeName="Document" ma:contentTypeID="0x010100BA117DE914E1FC49A35D90CD8516D943" ma:contentTypeVersion="12" ma:contentTypeDescription="Create a new document." ma:contentTypeScope="" ma:versionID="e1f7c3316c007ddcbbfc786aee0f30b6">
   <xsd:schema xmlns:xsd="http://www.w3.org/2001/XMLSchema" xmlns:xs="http://www.w3.org/2001/XMLSchema" xmlns:p="http://schemas.microsoft.com/office/2006/metadata/properties" xmlns:ns2="58f349b0-675b-4c01-8ee6-14db8fa12501" xmlns:ns3="df44d29e-ce0d-48fd-88bf-98e6a958fd4b" targetNamespace="http://schemas.microsoft.com/office/2006/metadata/properties" ma:root="true" ma:fieldsID="ebdd3e3611f83f5edb1b485483198b2e" ns2:_="" ns3:_="">
     <xsd:import namespace="58f349b0-675b-4c01-8ee6-14db8fa12501"/>
@@ -37942,6 +37958,12 @@
 </ct:contentTypeSchema>
 </file>
 
+<file path=customXml/item2.xml><?xml version="1.0" encoding="utf-8"?>
+<p:properties xmlns:p="http://schemas.microsoft.com/office/2006/metadata/properties" xmlns:xsi="http://www.w3.org/2001/XMLSchema-instance" xmlns:pc="http://schemas.microsoft.com/office/infopath/2007/PartnerControls">
+  <documentManagement/>
+</p:properties>
+</file>
+
 <file path=customXml/item3.xml><?xml version="1.0" encoding="utf-8"?>
 <?mso-contentType ?>
 <FormTemplates xmlns="http://schemas.microsoft.com/sharepoint/v3/contenttype/forms">
@@ -37952,23 +37974,6 @@
 </file>
 
 <file path=customXml/itemProps1.xml><?xml version="1.0" encoding="utf-8"?>
-<ds:datastoreItem xmlns:ds="http://schemas.openxmlformats.org/officeDocument/2006/customXml" ds:itemID="{412E3419-B313-4514-AD24-D56E1F80A63A}">
-  <ds:schemaRefs>
-    <ds:schemaRef ds:uri="58f349b0-675b-4c01-8ee6-14db8fa12501"/>
-    <ds:schemaRef ds:uri="http://www.w3.org/XML/1998/namespace"/>
-    <ds:schemaRef ds:uri="http://purl.org/dc/elements/1.1/"/>
-    <ds:schemaRef ds:uri="http://schemas.microsoft.com/office/2006/metadata/properties"/>
-    <ds:schemaRef ds:uri="http://schemas.microsoft.com/office/2006/documentManagement/types"/>
-    <ds:schemaRef ds:uri="http://purl.org/dc/terms/"/>
-    <ds:schemaRef ds:uri="http://purl.org/dc/dcmitype/"/>
-    <ds:schemaRef ds:uri="http://schemas.openxmlformats.org/package/2006/metadata/core-properties"/>
-    <ds:schemaRef ds:uri="http://schemas.microsoft.com/office/infopath/2007/PartnerControls"/>
-    <ds:schemaRef ds:uri="df44d29e-ce0d-48fd-88bf-98e6a958fd4b"/>
-  </ds:schemaRefs>
-</ds:datastoreItem>
-</file>
-
-<file path=customXml/itemProps2.xml><?xml version="1.0" encoding="utf-8"?>
 <ds:datastoreItem xmlns:ds="http://schemas.openxmlformats.org/officeDocument/2006/customXml" ds:itemID="{545DB04F-7584-4690-B257-DA90A69356DD}">
   <ds:schemaRefs>
     <ds:schemaRef ds:uri="58f349b0-675b-4c01-8ee6-14db8fa12501"/>
@@ -37987,6 +37992,23 @@
 </ds:datastoreItem>
 </file>
 
+<file path=customXml/itemProps2.xml><?xml version="1.0" encoding="utf-8"?>
+<ds:datastoreItem xmlns:ds="http://schemas.openxmlformats.org/officeDocument/2006/customXml" ds:itemID="{412E3419-B313-4514-AD24-D56E1F80A63A}">
+  <ds:schemaRefs>
+    <ds:schemaRef ds:uri="58f349b0-675b-4c01-8ee6-14db8fa12501"/>
+    <ds:schemaRef ds:uri="http://www.w3.org/XML/1998/namespace"/>
+    <ds:schemaRef ds:uri="http://purl.org/dc/elements/1.1/"/>
+    <ds:schemaRef ds:uri="http://schemas.microsoft.com/office/2006/metadata/properties"/>
+    <ds:schemaRef ds:uri="http://schemas.microsoft.com/office/2006/documentManagement/types"/>
+    <ds:schemaRef ds:uri="http://purl.org/dc/terms/"/>
+    <ds:schemaRef ds:uri="http://purl.org/dc/dcmitype/"/>
+    <ds:schemaRef ds:uri="http://schemas.openxmlformats.org/package/2006/metadata/core-properties"/>
+    <ds:schemaRef ds:uri="http://schemas.microsoft.com/office/infopath/2007/PartnerControls"/>
+    <ds:schemaRef ds:uri="df44d29e-ce0d-48fd-88bf-98e6a958fd4b"/>
+  </ds:schemaRefs>
+</ds:datastoreItem>
+</file>
+
 <file path=customXml/itemProps3.xml><?xml version="1.0" encoding="utf-8"?>
 <ds:datastoreItem xmlns:ds="http://schemas.openxmlformats.org/officeDocument/2006/customXml" ds:itemID="{87CA341C-74C1-4577-8C96-EF2605DC526A}">
   <ds:schemaRefs>

</xml_diff>